<commit_message>
more enhancements to logistic regression
</commit_message>
<xml_diff>
--- a/lectures/4-Model Selection.pptx
+++ b/lectures/4-Model Selection.pptx
@@ -5835,7 +5835,7 @@
           <a:p>
             <a:r>
               <a:rPr lang="en-US" sz="4800" dirty="0"/>
-              <a:t>Machine Learning for Public Policy</a:t>
+              <a:t>Machine Learning for Networking</a:t>
             </a:r>
           </a:p>
         </p:txBody>
@@ -5877,7 +5877,7 @@
             </a:br>
             <a:r>
               <a:rPr lang="en-US" dirty="0"/>
-              <a:t>Lecture 7.1: Model Selection and Cross Validation</a:t>
+              <a:t>Model Selection and Cross Validation</a:t>
             </a:r>
           </a:p>
         </p:txBody>

</xml_diff>